<commit_message>
updated intro slides and code
</commit_message>
<xml_diff>
--- a/slides/1_introduction.pptx
+++ b/slides/1_introduction.pptx
@@ -11,7 +11,7 @@
   <p:sldIdLst>
     <p:sldId id="258" r:id="rId3"/>
     <p:sldId id="347" r:id="rId4"/>
-    <p:sldId id="342" r:id="rId5"/>
+    <p:sldId id="348" r:id="rId5"/>
     <p:sldId id="343" r:id="rId6"/>
     <p:sldId id="341" r:id="rId7"/>
     <p:sldId id="345" r:id="rId8"/>
@@ -207,7 +207,7 @@
           <a:p>
             <a:fld id="{FE657195-C306-184F-9FD6-10BD56B986E5}" type="datetimeFigureOut">
               <a:rPr lang="en-US" smtClean="0"/>
-              <a:t>3/1/22</a:t>
+              <a:t>3/2/22</a:t>
             </a:fld>
             <a:endParaRPr lang="en-US"/>
           </a:p>
@@ -473,6 +473,342 @@
     </a:lvl9pPr>
   </p:notesStyle>
 </p:notesMaster>
+</file>
+
+<file path=ppt/notesSlides/notesSlide1.xml><?xml version="1.0" encoding="utf-8"?>
+<p:notes xmlns:a="http://schemas.openxmlformats.org/drawingml/2006/main" xmlns:r="http://schemas.openxmlformats.org/officeDocument/2006/relationships" xmlns:p="http://schemas.openxmlformats.org/presentationml/2006/main">
+  <p:cSld>
+    <p:spTree>
+      <p:nvGrpSpPr>
+        <p:cNvPr id="1" name=""/>
+        <p:cNvGrpSpPr/>
+        <p:nvPr/>
+      </p:nvGrpSpPr>
+      <p:grpSpPr>
+        <a:xfrm>
+          <a:off x="0" y="0"/>
+          <a:ext cx="0" cy="0"/>
+          <a:chOff x="0" y="0"/>
+          <a:chExt cx="0" cy="0"/>
+        </a:xfrm>
+      </p:grpSpPr>
+      <p:sp>
+        <p:nvSpPr>
+          <p:cNvPr id="2" name="Folienbildplatzhalter 1"/>
+          <p:cNvSpPr>
+            <a:spLocks noGrp="1" noRot="1" noChangeAspect="1"/>
+          </p:cNvSpPr>
+          <p:nvPr>
+            <p:ph type="sldImg"/>
+          </p:nvPr>
+        </p:nvSpPr>
+        <p:spPr/>
+      </p:sp>
+      <p:sp>
+        <p:nvSpPr>
+          <p:cNvPr id="3" name="Notizenplatzhalter 2"/>
+          <p:cNvSpPr>
+            <a:spLocks noGrp="1"/>
+          </p:cNvSpPr>
+          <p:nvPr>
+            <p:ph type="body" idx="1"/>
+          </p:nvPr>
+        </p:nvSpPr>
+        <p:spPr/>
+        <p:txBody>
+          <a:bodyPr/>
+          <a:lstStyle/>
+          <a:p>
+            <a:endParaRPr lang="en-US" dirty="0"/>
+          </a:p>
+        </p:txBody>
+      </p:sp>
+      <p:sp>
+        <p:nvSpPr>
+          <p:cNvPr id="4" name="Foliennummernplatzhalter 3"/>
+          <p:cNvSpPr>
+            <a:spLocks noGrp="1"/>
+          </p:cNvSpPr>
+          <p:nvPr>
+            <p:ph type="sldNum" sz="quarter" idx="5"/>
+          </p:nvPr>
+        </p:nvSpPr>
+        <p:spPr/>
+        <p:txBody>
+          <a:bodyPr/>
+          <a:lstStyle/>
+          <a:p>
+            <a:fld id="{8165942A-A615-AA47-970A-EDF92DB1EC89}" type="slidenum">
+              <a:rPr lang="en-US" smtClean="0"/>
+              <a:t>4</a:t>
+            </a:fld>
+            <a:endParaRPr lang="en-US"/>
+          </a:p>
+        </p:txBody>
+      </p:sp>
+    </p:spTree>
+    <p:extLst>
+      <p:ext uri="{BB962C8B-B14F-4D97-AF65-F5344CB8AC3E}">
+        <p14:creationId xmlns:p14="http://schemas.microsoft.com/office/powerpoint/2010/main" val="1378422891"/>
+      </p:ext>
+    </p:extLst>
+  </p:cSld>
+  <p:clrMapOvr>
+    <a:masterClrMapping/>
+  </p:clrMapOvr>
+</p:notes>
+</file>
+
+<file path=ppt/notesSlides/notesSlide2.xml><?xml version="1.0" encoding="utf-8"?>
+<p:notes xmlns:a="http://schemas.openxmlformats.org/drawingml/2006/main" xmlns:r="http://schemas.openxmlformats.org/officeDocument/2006/relationships" xmlns:p="http://schemas.openxmlformats.org/presentationml/2006/main">
+  <p:cSld>
+    <p:spTree>
+      <p:nvGrpSpPr>
+        <p:cNvPr id="1" name=""/>
+        <p:cNvGrpSpPr/>
+        <p:nvPr/>
+      </p:nvGrpSpPr>
+      <p:grpSpPr>
+        <a:xfrm>
+          <a:off x="0" y="0"/>
+          <a:ext cx="0" cy="0"/>
+          <a:chOff x="0" y="0"/>
+          <a:chExt cx="0" cy="0"/>
+        </a:xfrm>
+      </p:grpSpPr>
+      <p:sp>
+        <p:nvSpPr>
+          <p:cNvPr id="2" name="Folienbildplatzhalter 1"/>
+          <p:cNvSpPr>
+            <a:spLocks noGrp="1" noRot="1" noChangeAspect="1"/>
+          </p:cNvSpPr>
+          <p:nvPr>
+            <p:ph type="sldImg"/>
+          </p:nvPr>
+        </p:nvSpPr>
+        <p:spPr/>
+      </p:sp>
+      <p:sp>
+        <p:nvSpPr>
+          <p:cNvPr id="3" name="Notizenplatzhalter 2"/>
+          <p:cNvSpPr>
+            <a:spLocks noGrp="1"/>
+          </p:cNvSpPr>
+          <p:nvPr>
+            <p:ph type="body" idx="1"/>
+          </p:nvPr>
+        </p:nvSpPr>
+        <p:spPr/>
+        <p:txBody>
+          <a:bodyPr/>
+          <a:lstStyle/>
+          <a:p>
+            <a:endParaRPr lang="en-US" dirty="0"/>
+          </a:p>
+        </p:txBody>
+      </p:sp>
+      <p:sp>
+        <p:nvSpPr>
+          <p:cNvPr id="4" name="Foliennummernplatzhalter 3"/>
+          <p:cNvSpPr>
+            <a:spLocks noGrp="1"/>
+          </p:cNvSpPr>
+          <p:nvPr>
+            <p:ph type="sldNum" sz="quarter" idx="5"/>
+          </p:nvPr>
+        </p:nvSpPr>
+        <p:spPr/>
+        <p:txBody>
+          <a:bodyPr/>
+          <a:lstStyle/>
+          <a:p>
+            <a:fld id="{8165942A-A615-AA47-970A-EDF92DB1EC89}" type="slidenum">
+              <a:rPr lang="en-US" smtClean="0"/>
+              <a:t>5</a:t>
+            </a:fld>
+            <a:endParaRPr lang="en-US"/>
+          </a:p>
+        </p:txBody>
+      </p:sp>
+    </p:spTree>
+    <p:extLst>
+      <p:ext uri="{BB962C8B-B14F-4D97-AF65-F5344CB8AC3E}">
+        <p14:creationId xmlns:p14="http://schemas.microsoft.com/office/powerpoint/2010/main" val="381983591"/>
+      </p:ext>
+    </p:extLst>
+  </p:cSld>
+  <p:clrMapOvr>
+    <a:masterClrMapping/>
+  </p:clrMapOvr>
+</p:notes>
+</file>
+
+<file path=ppt/notesSlides/notesSlide3.xml><?xml version="1.0" encoding="utf-8"?>
+<p:notes xmlns:a="http://schemas.openxmlformats.org/drawingml/2006/main" xmlns:r="http://schemas.openxmlformats.org/officeDocument/2006/relationships" xmlns:p="http://schemas.openxmlformats.org/presentationml/2006/main">
+  <p:cSld>
+    <p:spTree>
+      <p:nvGrpSpPr>
+        <p:cNvPr id="1" name=""/>
+        <p:cNvGrpSpPr/>
+        <p:nvPr/>
+      </p:nvGrpSpPr>
+      <p:grpSpPr>
+        <a:xfrm>
+          <a:off x="0" y="0"/>
+          <a:ext cx="0" cy="0"/>
+          <a:chOff x="0" y="0"/>
+          <a:chExt cx="0" cy="0"/>
+        </a:xfrm>
+      </p:grpSpPr>
+      <p:sp>
+        <p:nvSpPr>
+          <p:cNvPr id="2" name="Folienbildplatzhalter 1"/>
+          <p:cNvSpPr>
+            <a:spLocks noGrp="1" noRot="1" noChangeAspect="1"/>
+          </p:cNvSpPr>
+          <p:nvPr>
+            <p:ph type="sldImg"/>
+          </p:nvPr>
+        </p:nvSpPr>
+        <p:spPr/>
+      </p:sp>
+      <p:sp>
+        <p:nvSpPr>
+          <p:cNvPr id="3" name="Notizenplatzhalter 2"/>
+          <p:cNvSpPr>
+            <a:spLocks noGrp="1"/>
+          </p:cNvSpPr>
+          <p:nvPr>
+            <p:ph type="body" idx="1"/>
+          </p:nvPr>
+        </p:nvSpPr>
+        <p:spPr/>
+        <p:txBody>
+          <a:bodyPr/>
+          <a:lstStyle/>
+          <a:p>
+            <a:endParaRPr lang="en-US" dirty="0"/>
+          </a:p>
+        </p:txBody>
+      </p:sp>
+      <p:sp>
+        <p:nvSpPr>
+          <p:cNvPr id="4" name="Foliennummernplatzhalter 3"/>
+          <p:cNvSpPr>
+            <a:spLocks noGrp="1"/>
+          </p:cNvSpPr>
+          <p:nvPr>
+            <p:ph type="sldNum" sz="quarter" idx="5"/>
+          </p:nvPr>
+        </p:nvSpPr>
+        <p:spPr/>
+        <p:txBody>
+          <a:bodyPr/>
+          <a:lstStyle/>
+          <a:p>
+            <a:fld id="{8165942A-A615-AA47-970A-EDF92DB1EC89}" type="slidenum">
+              <a:rPr lang="en-US" smtClean="0"/>
+              <a:t>7</a:t>
+            </a:fld>
+            <a:endParaRPr lang="en-US"/>
+          </a:p>
+        </p:txBody>
+      </p:sp>
+    </p:spTree>
+    <p:extLst>
+      <p:ext uri="{BB962C8B-B14F-4D97-AF65-F5344CB8AC3E}">
+        <p14:creationId xmlns:p14="http://schemas.microsoft.com/office/powerpoint/2010/main" val="1465510393"/>
+      </p:ext>
+    </p:extLst>
+  </p:cSld>
+  <p:clrMapOvr>
+    <a:masterClrMapping/>
+  </p:clrMapOvr>
+</p:notes>
+</file>
+
+<file path=ppt/notesSlides/notesSlide4.xml><?xml version="1.0" encoding="utf-8"?>
+<p:notes xmlns:a="http://schemas.openxmlformats.org/drawingml/2006/main" xmlns:r="http://schemas.openxmlformats.org/officeDocument/2006/relationships" xmlns:p="http://schemas.openxmlformats.org/presentationml/2006/main">
+  <p:cSld>
+    <p:spTree>
+      <p:nvGrpSpPr>
+        <p:cNvPr id="1" name=""/>
+        <p:cNvGrpSpPr/>
+        <p:nvPr/>
+      </p:nvGrpSpPr>
+      <p:grpSpPr>
+        <a:xfrm>
+          <a:off x="0" y="0"/>
+          <a:ext cx="0" cy="0"/>
+          <a:chOff x="0" y="0"/>
+          <a:chExt cx="0" cy="0"/>
+        </a:xfrm>
+      </p:grpSpPr>
+      <p:sp>
+        <p:nvSpPr>
+          <p:cNvPr id="2" name="Folienbildplatzhalter 1"/>
+          <p:cNvSpPr>
+            <a:spLocks noGrp="1" noRot="1" noChangeAspect="1"/>
+          </p:cNvSpPr>
+          <p:nvPr>
+            <p:ph type="sldImg"/>
+          </p:nvPr>
+        </p:nvSpPr>
+        <p:spPr/>
+      </p:sp>
+      <p:sp>
+        <p:nvSpPr>
+          <p:cNvPr id="3" name="Notizenplatzhalter 2"/>
+          <p:cNvSpPr>
+            <a:spLocks noGrp="1"/>
+          </p:cNvSpPr>
+          <p:nvPr>
+            <p:ph type="body" idx="1"/>
+          </p:nvPr>
+        </p:nvSpPr>
+        <p:spPr/>
+        <p:txBody>
+          <a:bodyPr/>
+          <a:lstStyle/>
+          <a:p>
+            <a:endParaRPr lang="en-US" dirty="0"/>
+          </a:p>
+        </p:txBody>
+      </p:sp>
+      <p:sp>
+        <p:nvSpPr>
+          <p:cNvPr id="4" name="Foliennummernplatzhalter 3"/>
+          <p:cNvSpPr>
+            <a:spLocks noGrp="1"/>
+          </p:cNvSpPr>
+          <p:nvPr>
+            <p:ph type="sldNum" sz="quarter" idx="5"/>
+          </p:nvPr>
+        </p:nvSpPr>
+        <p:spPr/>
+        <p:txBody>
+          <a:bodyPr/>
+          <a:lstStyle/>
+          <a:p>
+            <a:fld id="{8165942A-A615-AA47-970A-EDF92DB1EC89}" type="slidenum">
+              <a:rPr lang="en-US" smtClean="0"/>
+              <a:t>9</a:t>
+            </a:fld>
+            <a:endParaRPr lang="en-US"/>
+          </a:p>
+        </p:txBody>
+      </p:sp>
+    </p:spTree>
+    <p:extLst>
+      <p:ext uri="{BB962C8B-B14F-4D97-AF65-F5344CB8AC3E}">
+        <p14:creationId xmlns:p14="http://schemas.microsoft.com/office/powerpoint/2010/main" val="2674622859"/>
+      </p:ext>
+    </p:extLst>
+  </p:cSld>
+  <p:clrMapOvr>
+    <a:masterClrMapping/>
+  </p:clrMapOvr>
+</p:notes>
 </file>
 
 <file path=ppt/slideLayouts/slideLayout1.xml><?xml version="1.0" encoding="utf-8"?>
@@ -5542,7 +5878,7 @@
         </p:nvSpPr>
         <p:spPr>
           <a:xfrm>
-            <a:off x="323999" y="1224000"/>
+            <a:off x="323999" y="967623"/>
             <a:ext cx="9270669" cy="3743640"/>
           </a:xfrm>
           <a:prstGeom prst="rect">
@@ -5642,6 +5978,48 @@
             </a:endParaRPr>
           </a:p>
           <a:p>
+            <a:pPr marL="720" lvl="2">
+              <a:lnSpc>
+                <a:spcPct val="110000"/>
+              </a:lnSpc>
+              <a:buClr>
+                <a:srgbClr val="009AD1"/>
+              </a:buClr>
+              <a:tabLst>
+                <a:tab pos="0" algn="l"/>
+              </a:tabLst>
+            </a:pPr>
+            <a:r>
+              <a:rPr lang="en-US" sz="1600" spc="-1" dirty="0">
+                <a:solidFill>
+                  <a:srgbClr val="000000"/>
+                </a:solidFill>
+              </a:rPr>
+              <a:t>Doctoral researcher </a:t>
+            </a:r>
+          </a:p>
+          <a:p>
+            <a:pPr marL="720" lvl="2">
+              <a:lnSpc>
+                <a:spcPct val="110000"/>
+              </a:lnSpc>
+              <a:buClr>
+                <a:srgbClr val="009AD1"/>
+              </a:buClr>
+              <a:tabLst>
+                <a:tab pos="0" algn="l"/>
+              </a:tabLst>
+            </a:pPr>
+            <a:r>
+              <a:rPr lang="en-US" sz="1600" spc="-1" dirty="0">
+                <a:solidFill>
+                  <a:srgbClr val="000000"/>
+                </a:solidFill>
+              </a:rPr>
+              <a:t>             @ </a:t>
+            </a:r>
+          </a:p>
+          <a:p>
             <a:pPr marL="324000" lvl="2" indent="-323280">
               <a:lnSpc>
                 <a:spcPct val="110000"/>
@@ -5655,14 +6033,11 @@
                 <a:tab pos="0" algn="l"/>
               </a:tabLst>
             </a:pPr>
-            <a:r>
-              <a:rPr lang="en-US" sz="1600" spc="-1" dirty="0">
-                <a:solidFill>
-                  <a:srgbClr val="000000"/>
-                </a:solidFill>
-              </a:rPr>
-              <a:t>Doctoral researcher at the Cluster of Excellence “The Politics of Inequality”, University of Konstanz</a:t>
-            </a:r>
+            <a:endParaRPr lang="en-US" sz="1600" b="1" spc="-1" dirty="0">
+              <a:solidFill>
+                <a:srgbClr val="000000"/>
+              </a:solidFill>
+            </a:endParaRPr>
           </a:p>
           <a:p>
             <a:pPr marL="324000" lvl="2" indent="-323280">
@@ -5678,17 +6053,14 @@
                 <a:tab pos="0" algn="l"/>
               </a:tabLst>
             </a:pPr>
-            <a:r>
-              <a:rPr lang="en-US" sz="1600" spc="-1" dirty="0">
-                <a:solidFill>
-                  <a:srgbClr val="000000"/>
-                </a:solidFill>
-              </a:rPr>
-              <a:t>Research interest: </a:t>
-            </a:r>
-          </a:p>
-          <a:p>
-            <a:pPr marL="781200" lvl="3" indent="-323280">
+            <a:endParaRPr lang="en-US" sz="1600" b="1" spc="-1" dirty="0">
+              <a:solidFill>
+                <a:srgbClr val="000000"/>
+              </a:solidFill>
+            </a:endParaRPr>
+          </a:p>
+          <a:p>
+            <a:pPr marL="324000" lvl="2" indent="-323280">
               <a:lnSpc>
                 <a:spcPct val="110000"/>
               </a:lnSpc>
@@ -5701,14 +6073,104 @@
                 <a:tab pos="0" algn="l"/>
               </a:tabLst>
             </a:pPr>
+            <a:endParaRPr lang="en-US" sz="1600" b="1" spc="-1" dirty="0">
+              <a:solidFill>
+                <a:srgbClr val="000000"/>
+              </a:solidFill>
+            </a:endParaRPr>
+          </a:p>
+          <a:p>
+            <a:pPr marL="2743920" lvl="8">
+              <a:lnSpc>
+                <a:spcPct val="110000"/>
+              </a:lnSpc>
+              <a:buClr>
+                <a:srgbClr val="009AD1"/>
+              </a:buClr>
+              <a:tabLst>
+                <a:tab pos="0" algn="l"/>
+              </a:tabLst>
+            </a:pPr>
+            <a:endParaRPr lang="en-US" sz="1600" b="1" spc="-1" dirty="0">
+              <a:solidFill>
+                <a:srgbClr val="000000"/>
+              </a:solidFill>
+            </a:endParaRPr>
+          </a:p>
+          <a:p>
+            <a:pPr marL="2743920" lvl="8">
+              <a:lnSpc>
+                <a:spcPct val="110000"/>
+              </a:lnSpc>
+              <a:buClr>
+                <a:srgbClr val="009AD1"/>
+              </a:buClr>
+              <a:tabLst>
+                <a:tab pos="0" algn="l"/>
+              </a:tabLst>
+            </a:pPr>
+            <a:endParaRPr lang="en-US" sz="1600" b="1" spc="-1" dirty="0">
+              <a:solidFill>
+                <a:srgbClr val="000000"/>
+              </a:solidFill>
+            </a:endParaRPr>
+          </a:p>
+          <a:p>
+            <a:pPr marL="2743920" lvl="8">
+              <a:lnSpc>
+                <a:spcPct val="110000"/>
+              </a:lnSpc>
+              <a:buClr>
+                <a:srgbClr val="009AD1"/>
+              </a:buClr>
+              <a:tabLst>
+                <a:tab pos="0" algn="l"/>
+              </a:tabLst>
+            </a:pPr>
+            <a:endParaRPr lang="en-US" sz="1600" spc="-1" dirty="0">
+              <a:solidFill>
+                <a:srgbClr val="000000"/>
+              </a:solidFill>
+            </a:endParaRPr>
+          </a:p>
+          <a:p>
+            <a:pPr marL="2743920" lvl="8">
+              <a:lnSpc>
+                <a:spcPct val="110000"/>
+              </a:lnSpc>
+              <a:buClr>
+                <a:srgbClr val="009AD1"/>
+              </a:buClr>
+              <a:tabLst>
+                <a:tab pos="0" algn="l"/>
+              </a:tabLst>
+            </a:pPr>
             <a:r>
               <a:rPr lang="en-US" sz="1600" spc="-1" dirty="0">
                 <a:solidFill>
                   <a:srgbClr val="000000"/>
                 </a:solidFill>
               </a:rPr>
-              <a:t>Broad: Natural language processing (NLP)</a:t>
-            </a:r>
+              <a:t>Research Interest: </a:t>
+            </a:r>
+          </a:p>
+          <a:p>
+            <a:pPr marL="2743920" lvl="8">
+              <a:lnSpc>
+                <a:spcPct val="110000"/>
+              </a:lnSpc>
+              <a:buClr>
+                <a:srgbClr val="009AD1"/>
+              </a:buClr>
+              <a:tabLst>
+                <a:tab pos="0" algn="l"/>
+              </a:tabLst>
+            </a:pPr>
+            <a:endParaRPr lang="en-US" sz="1600" spc="-1" dirty="0">
+              <a:solidFill>
+                <a:srgbClr val="000000"/>
+              </a:solidFill>
+            </a:endParaRPr>
           </a:p>
           <a:p>
             <a:pPr marL="781200" lvl="3" indent="-323280">
@@ -5730,60 +6192,11 @@
                   <a:srgbClr val="000000"/>
                 </a:solidFill>
               </a:rPr>
-              <a:t>Narrow: Automated detection of frames and linguistic devices for framing in political discourse; Operationalizing linguistic knowledge for NLP applications</a:t>
-            </a:r>
-          </a:p>
-          <a:p>
-            <a:pPr marL="720" lvl="2">
-              <a:lnSpc>
-                <a:spcPct val="110000"/>
-              </a:lnSpc>
-              <a:buClr>
-                <a:srgbClr val="009AD1"/>
-              </a:buClr>
-              <a:tabLst>
-                <a:tab pos="0" algn="l"/>
-              </a:tabLst>
-            </a:pPr>
-            <a:endParaRPr lang="en-US" sz="1600" b="1" spc="-1" dirty="0"/>
-          </a:p>
-          <a:p>
-            <a:pPr marL="720" lvl="2">
-              <a:lnSpc>
-                <a:spcPct val="110000"/>
-              </a:lnSpc>
-              <a:buClr>
-                <a:srgbClr val="009AD1"/>
-              </a:buClr>
-              <a:tabLst>
-                <a:tab pos="0" algn="l"/>
-              </a:tabLst>
-            </a:pPr>
-            <a:r>
-              <a:rPr lang="en-US" sz="1600" b="1" spc="-1" dirty="0"/>
-              <a:t>Me and Python: </a:t>
-            </a:r>
-          </a:p>
-          <a:p>
-            <a:pPr marL="720" lvl="2">
-              <a:lnSpc>
-                <a:spcPct val="110000"/>
-              </a:lnSpc>
-              <a:buClr>
-                <a:srgbClr val="009AD1"/>
-              </a:buClr>
-              <a:tabLst>
-                <a:tab pos="0" algn="l"/>
-              </a:tabLst>
-            </a:pPr>
-            <a:endParaRPr lang="en-US" sz="1600" spc="-1" dirty="0">
-              <a:solidFill>
-                <a:srgbClr val="000000"/>
-              </a:solidFill>
-            </a:endParaRPr>
-          </a:p>
-          <a:p>
-            <a:pPr marL="324000" lvl="2" indent="-323280">
+              <a:t>Broad: Natural language processing (NLP); Operationalizing well-studied semantic and pragmatic phenomena for NLP applications</a:t>
+            </a:r>
+          </a:p>
+          <a:p>
+            <a:pPr marL="781200" lvl="3" indent="-323280">
               <a:lnSpc>
                 <a:spcPct val="110000"/>
               </a:lnSpc>
@@ -5802,24 +6215,7 @@
                   <a:srgbClr val="000000"/>
                 </a:solidFill>
               </a:rPr>
-              <a:t>Python is one of my daily “working language” (besides English and German </a:t>
-            </a:r>
-            <a:r>
-              <a:rPr lang="en-US" sz="1600" spc="-1" dirty="0">
-                <a:solidFill>
-                  <a:srgbClr val="000000"/>
-                </a:solidFill>
-                <a:sym typeface="Wingdings" pitchFamily="2" charset="2"/>
-              </a:rPr>
-              <a:t></a:t>
-            </a:r>
-            <a:r>
-              <a:rPr lang="en-US" sz="1600" spc="-1" dirty="0">
-                <a:solidFill>
-                  <a:srgbClr val="000000"/>
-                </a:solidFill>
-              </a:rPr>
-              <a:t>)</a:t>
+              <a:t>Narrow – My work at the project “Framing Inequalities”: Automated detection of linguistic devices for framing in political discourses</a:t>
             </a:r>
           </a:p>
           <a:p>
@@ -5836,15 +6232,11 @@
                 <a:tab pos="0" algn="l"/>
               </a:tabLst>
             </a:pPr>
-            <a:r>
-              <a:rPr lang="en-US" sz="1600" spc="-1" dirty="0">
-                <a:solidFill>
-                  <a:srgbClr val="000000"/>
-                </a:solidFill>
-              </a:rPr>
-              <a:t>Previous experiences in industry and study: Using Python for data extraction and analysis, and generally automatizing boring repeating procedures</a:t>
-            </a:r>
-            <a:endParaRPr lang="en-US" sz="1600" spc="-1" dirty="0"/>
+            <a:endParaRPr lang="en-US" sz="1600" spc="-1" dirty="0">
+              <a:solidFill>
+                <a:srgbClr val="000000"/>
+              </a:solidFill>
+            </a:endParaRPr>
           </a:p>
           <a:p>
             <a:pPr marL="324000" lvl="2" indent="-323280">
@@ -5860,6 +6252,24 @@
                 <a:tab pos="0" algn="l"/>
               </a:tabLst>
             </a:pPr>
+            <a:endParaRPr lang="en-US" sz="1600" b="1" spc="-1" dirty="0">
+              <a:solidFill>
+                <a:srgbClr val="000000"/>
+              </a:solidFill>
+            </a:endParaRPr>
+          </a:p>
+          <a:p>
+            <a:pPr marL="720" lvl="2">
+              <a:lnSpc>
+                <a:spcPct val="110000"/>
+              </a:lnSpc>
+              <a:buClr>
+                <a:srgbClr val="009AD1"/>
+              </a:buClr>
+              <a:tabLst>
+                <a:tab pos="0" algn="l"/>
+              </a:tabLst>
+            </a:pPr>
             <a:endParaRPr lang="en-US" sz="1600" spc="-1" dirty="0">
               <a:solidFill>
                 <a:srgbClr val="000000"/>
@@ -5916,10 +6326,347 @@
           </a:p>
         </p:txBody>
       </p:sp>
+      <p:pic>
+        <p:nvPicPr>
+          <p:cNvPr id="4" name="Grafik 3">
+            <a:extLst>
+              <a:ext uri="{FF2B5EF4-FFF2-40B4-BE49-F238E27FC236}">
+                <a16:creationId xmlns:a16="http://schemas.microsoft.com/office/drawing/2014/main" id="{EF592FCE-4CFE-CA4F-BB9E-B3B4CD37D507}"/>
+              </a:ext>
+            </a:extLst>
+          </p:cNvPr>
+          <p:cNvPicPr>
+            <a:picLocks noChangeAspect="1"/>
+          </p:cNvPicPr>
+          <p:nvPr/>
+        </p:nvPicPr>
+        <p:blipFill>
+          <a:blip r:embed="rId2">
+            <a:extLst>
+              <a:ext uri="{28A0092B-C50C-407E-A947-70E740481C1C}">
+                <a14:useLocalDpi xmlns:a14="http://schemas.microsoft.com/office/drawing/2010/main" val="0"/>
+              </a:ext>
+            </a:extLst>
+          </a:blip>
+          <a:stretch>
+            <a:fillRect/>
+          </a:stretch>
+        </p:blipFill>
+        <p:spPr>
+          <a:xfrm>
+            <a:off x="323998" y="2071833"/>
+            <a:ext cx="2109673" cy="1068716"/>
+          </a:xfrm>
+          <a:prstGeom prst="rect">
+            <a:avLst/>
+          </a:prstGeom>
+        </p:spPr>
+      </p:pic>
+      <p:pic>
+        <p:nvPicPr>
+          <p:cNvPr id="5" name="Grafik 4">
+            <a:extLst>
+              <a:ext uri="{FF2B5EF4-FFF2-40B4-BE49-F238E27FC236}">
+                <a16:creationId xmlns:a16="http://schemas.microsoft.com/office/drawing/2014/main" id="{9B29A9A3-F61A-404A-899D-5F4EB91B4E4B}"/>
+              </a:ext>
+            </a:extLst>
+          </p:cNvPr>
+          <p:cNvPicPr>
+            <a:picLocks noChangeAspect="1"/>
+          </p:cNvPicPr>
+          <p:nvPr/>
+        </p:nvPicPr>
+        <p:blipFill>
+          <a:blip r:embed="rId3" cstate="hqprint">
+            <a:extLst>
+              <a:ext uri="{28A0092B-C50C-407E-A947-70E740481C1C}">
+                <a14:useLocalDpi xmlns:a14="http://schemas.microsoft.com/office/drawing/2010/main" val="0"/>
+              </a:ext>
+            </a:extLst>
+          </a:blip>
+          <a:stretch>
+            <a:fillRect/>
+          </a:stretch>
+        </p:blipFill>
+        <p:spPr>
+          <a:xfrm>
+            <a:off x="4416468" y="2294982"/>
+            <a:ext cx="3023850" cy="694800"/>
+          </a:xfrm>
+          <a:prstGeom prst="rect">
+            <a:avLst/>
+          </a:prstGeom>
+        </p:spPr>
+      </p:pic>
+      <p:sp>
+        <p:nvSpPr>
+          <p:cNvPr id="6" name="CustomShape 2">
+            <a:extLst>
+              <a:ext uri="{FF2B5EF4-FFF2-40B4-BE49-F238E27FC236}">
+                <a16:creationId xmlns:a16="http://schemas.microsoft.com/office/drawing/2014/main" id="{0A699EFF-1220-D841-A1BC-08CE13903084}"/>
+              </a:ext>
+            </a:extLst>
+          </p:cNvPr>
+          <p:cNvSpPr/>
+          <p:nvPr/>
+        </p:nvSpPr>
+        <p:spPr>
+          <a:xfrm>
+            <a:off x="4493380" y="1335889"/>
+            <a:ext cx="7772989" cy="3235403"/>
+          </a:xfrm>
+          <a:prstGeom prst="rect">
+            <a:avLst/>
+          </a:prstGeom>
+          <a:noFill/>
+          <a:ln>
+            <a:noFill/>
+          </a:ln>
+        </p:spPr>
+        <p:style>
+          <a:lnRef idx="0">
+            <a:scrgbClr r="0" g="0" b="0"/>
+          </a:lnRef>
+          <a:fillRef idx="0">
+            <a:scrgbClr r="0" g="0" b="0"/>
+          </a:fillRef>
+          <a:effectRef idx="0">
+            <a:scrgbClr r="0" g="0" b="0"/>
+          </a:effectRef>
+          <a:fontRef idx="minor"/>
+        </p:style>
+        <p:txBody>
+          <a:bodyPr lIns="0" tIns="0" rIns="0" bIns="0">
+            <a:noAutofit/>
+          </a:bodyPr>
+          <a:lstStyle/>
+          <a:p>
+            <a:pPr marL="324000" lvl="2" indent="-323280">
+              <a:lnSpc>
+                <a:spcPct val="110000"/>
+              </a:lnSpc>
+              <a:buClr>
+                <a:srgbClr val="009AD1"/>
+              </a:buClr>
+              <a:buFont typeface="Arial"/>
+              <a:buChar char="−"/>
+              <a:tabLst>
+                <a:tab pos="0" algn="l"/>
+              </a:tabLst>
+            </a:pPr>
+            <a:endParaRPr lang="en-US" sz="1600" spc="-1" dirty="0">
+              <a:solidFill>
+                <a:srgbClr val="000000"/>
+              </a:solidFill>
+            </a:endParaRPr>
+          </a:p>
+          <a:p>
+            <a:pPr marL="720" lvl="2">
+              <a:lnSpc>
+                <a:spcPct val="110000"/>
+              </a:lnSpc>
+              <a:buClr>
+                <a:srgbClr val="009AD1"/>
+              </a:buClr>
+              <a:tabLst>
+                <a:tab pos="0" algn="l"/>
+              </a:tabLst>
+            </a:pPr>
+            <a:r>
+              <a:rPr lang="en-US" sz="1600" spc="-1" dirty="0">
+                <a:solidFill>
+                  <a:srgbClr val="000000"/>
+                </a:solidFill>
+              </a:rPr>
+              <a:t>Project “Framing Inequalities”</a:t>
+            </a:r>
+          </a:p>
+          <a:p>
+            <a:pPr marL="720" lvl="2">
+              <a:lnSpc>
+                <a:spcPct val="110000"/>
+              </a:lnSpc>
+              <a:buClr>
+                <a:srgbClr val="009AD1"/>
+              </a:buClr>
+              <a:tabLst>
+                <a:tab pos="0" algn="l"/>
+              </a:tabLst>
+            </a:pPr>
+            <a:r>
+              <a:rPr lang="en-US" sz="1600" spc="-1" dirty="0">
+                <a:solidFill>
+                  <a:srgbClr val="000000"/>
+                </a:solidFill>
+              </a:rPr>
+              <a:t>	      @ </a:t>
+            </a:r>
+          </a:p>
+          <a:p>
+            <a:pPr marL="324000" lvl="2" indent="-323280">
+              <a:lnSpc>
+                <a:spcPct val="110000"/>
+              </a:lnSpc>
+              <a:buClr>
+                <a:srgbClr val="009AD1"/>
+              </a:buClr>
+              <a:buFont typeface="Arial"/>
+              <a:buChar char="−"/>
+              <a:tabLst>
+                <a:tab pos="0" algn="l"/>
+              </a:tabLst>
+            </a:pPr>
+            <a:endParaRPr lang="en-US" sz="1600" b="1" spc="-1" dirty="0">
+              <a:solidFill>
+                <a:srgbClr val="000000"/>
+              </a:solidFill>
+            </a:endParaRPr>
+          </a:p>
+          <a:p>
+            <a:pPr marL="324000" lvl="2" indent="-323280">
+              <a:lnSpc>
+                <a:spcPct val="110000"/>
+              </a:lnSpc>
+              <a:buClr>
+                <a:srgbClr val="009AD1"/>
+              </a:buClr>
+              <a:buFont typeface="Arial"/>
+              <a:buChar char="−"/>
+              <a:tabLst>
+                <a:tab pos="0" algn="l"/>
+              </a:tabLst>
+            </a:pPr>
+            <a:endParaRPr lang="en-US" sz="1600" b="1" spc="-1" dirty="0">
+              <a:solidFill>
+                <a:srgbClr val="000000"/>
+              </a:solidFill>
+            </a:endParaRPr>
+          </a:p>
+          <a:p>
+            <a:pPr marL="324000" lvl="2" indent="-323280">
+              <a:lnSpc>
+                <a:spcPct val="110000"/>
+              </a:lnSpc>
+              <a:buClr>
+                <a:srgbClr val="009AD1"/>
+              </a:buClr>
+              <a:buFont typeface="Arial"/>
+              <a:buChar char="−"/>
+              <a:tabLst>
+                <a:tab pos="0" algn="l"/>
+              </a:tabLst>
+            </a:pPr>
+            <a:endParaRPr lang="en-US" sz="1600" b="1" spc="-1" dirty="0">
+              <a:solidFill>
+                <a:srgbClr val="000000"/>
+              </a:solidFill>
+            </a:endParaRPr>
+          </a:p>
+          <a:p>
+            <a:pPr marL="324000" lvl="2" indent="-323280">
+              <a:lnSpc>
+                <a:spcPct val="110000"/>
+              </a:lnSpc>
+              <a:buClr>
+                <a:srgbClr val="009AD1"/>
+              </a:buClr>
+              <a:buFont typeface="Arial"/>
+              <a:buChar char="−"/>
+              <a:tabLst>
+                <a:tab pos="0" algn="l"/>
+              </a:tabLst>
+            </a:pPr>
+            <a:endParaRPr lang="en-US" sz="1600" b="1" spc="-1" dirty="0">
+              <a:solidFill>
+                <a:srgbClr val="000000"/>
+              </a:solidFill>
+            </a:endParaRPr>
+          </a:p>
+          <a:p>
+            <a:pPr marL="324000" lvl="2" indent="-323280">
+              <a:lnSpc>
+                <a:spcPct val="110000"/>
+              </a:lnSpc>
+              <a:buClr>
+                <a:srgbClr val="009AD1"/>
+              </a:buClr>
+              <a:buFont typeface="Arial"/>
+              <a:buChar char="−"/>
+              <a:tabLst>
+                <a:tab pos="0" algn="l"/>
+              </a:tabLst>
+            </a:pPr>
+            <a:endParaRPr lang="en-US" sz="1600" b="1" spc="-1" dirty="0">
+              <a:solidFill>
+                <a:srgbClr val="000000"/>
+              </a:solidFill>
+            </a:endParaRPr>
+          </a:p>
+          <a:p>
+            <a:pPr>
+              <a:lnSpc>
+                <a:spcPct val="110000"/>
+              </a:lnSpc>
+              <a:tabLst>
+                <a:tab pos="0" algn="l"/>
+              </a:tabLst>
+            </a:pPr>
+            <a:endParaRPr lang="en-US" sz="1600" b="1" spc="-1" dirty="0">
+              <a:solidFill>
+                <a:srgbClr val="000000"/>
+              </a:solidFill>
+            </a:endParaRPr>
+          </a:p>
+        </p:txBody>
+      </p:sp>
+      <p:sp>
+        <p:nvSpPr>
+          <p:cNvPr id="2" name="Geschweifte Klammer rechts 1">
+            <a:extLst>
+              <a:ext uri="{FF2B5EF4-FFF2-40B4-BE49-F238E27FC236}">
+                <a16:creationId xmlns:a16="http://schemas.microsoft.com/office/drawing/2014/main" id="{EE1733A9-6F7A-6E44-A1C3-6A3863F8B221}"/>
+              </a:ext>
+            </a:extLst>
+          </p:cNvPr>
+          <p:cNvSpPr/>
+          <p:nvPr/>
+        </p:nvSpPr>
+        <p:spPr>
+          <a:xfrm rot="5400000">
+            <a:off x="3925464" y="817160"/>
+            <a:ext cx="282011" cy="4971533"/>
+          </a:xfrm>
+          <a:prstGeom prst="rightBrace">
+            <a:avLst/>
+          </a:prstGeom>
+        </p:spPr>
+        <p:style>
+          <a:lnRef idx="1">
+            <a:schemeClr val="accent1"/>
+          </a:lnRef>
+          <a:fillRef idx="0">
+            <a:schemeClr val="accent1"/>
+          </a:fillRef>
+          <a:effectRef idx="0">
+            <a:schemeClr val="accent1"/>
+          </a:effectRef>
+          <a:fontRef idx="minor">
+            <a:schemeClr val="tx1"/>
+          </a:fontRef>
+        </p:style>
+        <p:txBody>
+          <a:bodyPr rtlCol="0" anchor="ctr"/>
+          <a:lstStyle/>
+          <a:p>
+            <a:pPr algn="ctr"/>
+            <a:endParaRPr lang="en-US"/>
+          </a:p>
+        </p:txBody>
+      </p:sp>
     </p:spTree>
     <p:extLst>
       <p:ext uri="{BB962C8B-B14F-4D97-AF65-F5344CB8AC3E}">
-        <p14:creationId xmlns:p14="http://schemas.microsoft.com/office/powerpoint/2010/main" val="1116074375"/>
+        <p14:creationId xmlns:p14="http://schemas.microsoft.com/office/powerpoint/2010/main" val="833543455"/>
       </p:ext>
     </p:extLst>
   </p:cSld>
@@ -6129,6 +6876,24 @@
           </a:bodyPr>
           <a:lstStyle/>
           <a:p>
+            <a:pPr marL="720" lvl="2">
+              <a:lnSpc>
+                <a:spcPct val="110000"/>
+              </a:lnSpc>
+              <a:buClr>
+                <a:srgbClr val="009AD1"/>
+              </a:buClr>
+              <a:tabLst>
+                <a:tab pos="0" algn="l"/>
+              </a:tabLst>
+            </a:pPr>
+            <a:endParaRPr lang="en-US" sz="1600" spc="-1" dirty="0">
+              <a:solidFill>
+                <a:srgbClr val="000000"/>
+              </a:solidFill>
+            </a:endParaRPr>
+          </a:p>
+          <a:p>
             <a:pPr marL="324000" lvl="2" indent="-323280">
               <a:lnSpc>
                 <a:spcPct val="110000"/>
@@ -6148,39 +6913,7 @@
                   <a:srgbClr val="000000"/>
                 </a:solidFill>
               </a:rPr>
-              <a:t>Your background: Do you identify yourself as having a </a:t>
-            </a:r>
-            <a:r>
-              <a:rPr lang="en-US" sz="1600" i="1" spc="-1" dirty="0">
-                <a:solidFill>
-                  <a:srgbClr val="000000"/>
-                </a:solidFill>
-              </a:rPr>
-              <a:t>theoretical</a:t>
-            </a:r>
-            <a:r>
-              <a:rPr lang="en-US" sz="1600" spc="-1" dirty="0">
-                <a:solidFill>
-                  <a:srgbClr val="000000"/>
-                </a:solidFill>
-              </a:rPr>
-              <a:t> or an </a:t>
-            </a:r>
-            <a:r>
-              <a:rPr lang="en-US" sz="1600" i="1" spc="-1" dirty="0">
-                <a:solidFill>
-                  <a:srgbClr val="000000"/>
-                </a:solidFill>
-              </a:rPr>
-              <a:t>empirical</a:t>
-            </a:r>
-            <a:r>
-              <a:rPr lang="en-US" sz="1600" spc="-1" dirty="0">
-                <a:solidFill>
-                  <a:srgbClr val="000000"/>
-                </a:solidFill>
-              </a:rPr>
-              <a:t> background? </a:t>
+              <a:t>Experiences with programming languages other than Python? (E.g., R)</a:t>
             </a:r>
           </a:p>
           <a:p>
@@ -6218,29 +6951,9 @@
               </a:tabLst>
             </a:pPr>
             <a:r>
-              <a:rPr lang="en-US" sz="1600" spc="-1" dirty="0">
-                <a:solidFill>
-                  <a:srgbClr val="000000"/>
-                </a:solidFill>
-              </a:rPr>
-              <a:t>Programming experiences in languages other than Python?</a:t>
-            </a:r>
-          </a:p>
-          <a:p>
-            <a:pPr marL="324000" lvl="2" indent="-323280">
-              <a:lnSpc>
-                <a:spcPct val="110000"/>
-              </a:lnSpc>
-              <a:buClr>
-                <a:srgbClr val="009AD1"/>
-              </a:buClr>
-              <a:buFont typeface="Arial"/>
-              <a:buChar char="−"/>
-              <a:tabLst>
-                <a:tab pos="0" algn="l"/>
-              </a:tabLst>
-            </a:pPr>
-            <a:endParaRPr lang="en-US" sz="1600" b="1" spc="-1" dirty="0"/>
+              <a:rPr lang="en-US" sz="1600" spc="-1" dirty="0"/>
+              <a:t>Which operating system do you use? (E.g., Windows, Mac OS, …) </a:t>
+            </a:r>
           </a:p>
           <a:p>
             <a:pPr marL="720" lvl="2">
@@ -6475,18 +7188,9 @@
                 <a:solidFill>
                   <a:srgbClr val="000000"/>
                 </a:solidFill>
-                <a:hlinkClick r:id="rId2"/>
-              </a:rPr>
-              <a:t>https://github.com/qi-yu</a:t>
-            </a:r>
-            <a:r>
-              <a:rPr lang="en-US" sz="1600" spc="-1">
-                <a:solidFill>
-                  <a:srgbClr val="000000"/>
-                </a:solidFill>
-                <a:hlinkClick r:id="rId2"/>
-              </a:rPr>
-              <a:t>/teaching-materials-python</a:t>
+                <a:hlinkClick r:id="rId3"/>
+              </a:rPr>
+              <a:t>https://github.com/qi-yu/teaching-materials-python</a:t>
             </a:r>
             <a:endParaRPr lang="en-US" sz="1600" spc="-1" dirty="0">
               <a:solidFill>
@@ -6495,7 +7199,7 @@
             </a:endParaRPr>
           </a:p>
           <a:p>
-            <a:pPr marL="324000" lvl="2" indent="-323280">
+            <a:pPr marL="781200" lvl="3" indent="-323280">
               <a:lnSpc>
                 <a:spcPct val="110000"/>
               </a:lnSpc>
@@ -6508,14 +7212,17 @@
                 <a:tab pos="0" algn="l"/>
               </a:tabLst>
             </a:pPr>
-            <a:endParaRPr lang="en-US" sz="1600" spc="-1" dirty="0">
-              <a:solidFill>
-                <a:srgbClr val="000000"/>
-              </a:solidFill>
-            </a:endParaRPr>
-          </a:p>
-          <a:p>
-            <a:pPr marL="324000" lvl="2" indent="-323280">
+            <a:r>
+              <a:rPr lang="en-US" sz="1600" spc="-1" dirty="0">
+                <a:solidFill>
+                  <a:srgbClr val="000000"/>
+                </a:solidFill>
+              </a:rPr>
+              <a:t>Please download them. We will play with the codes there during the course.</a:t>
+            </a:r>
+          </a:p>
+          <a:p>
+            <a:pPr marL="781200" lvl="3" indent="-323280">
               <a:lnSpc>
                 <a:spcPct val="110000"/>
               </a:lnSpc>
@@ -6535,7 +7242,7 @@
             </a:endParaRPr>
           </a:p>
           <a:p>
-            <a:pPr marL="324000" lvl="2" indent="-323280">
+            <a:pPr marL="781200" lvl="3" indent="-323280">
               <a:lnSpc>
                 <a:spcPct val="110000"/>
               </a:lnSpc>
@@ -6548,14 +7255,201 @@
                 <a:tab pos="0" algn="l"/>
               </a:tabLst>
             </a:pPr>
+            <a:endParaRPr lang="en-US" sz="1600" spc="-1" dirty="0">
+              <a:solidFill>
+                <a:srgbClr val="000000"/>
+              </a:solidFill>
+            </a:endParaRPr>
+          </a:p>
+          <a:p>
+            <a:pPr marL="324000" lvl="2" indent="-323280">
+              <a:lnSpc>
+                <a:spcPct val="110000"/>
+              </a:lnSpc>
+              <a:buClr>
+                <a:srgbClr val="009AD1"/>
+              </a:buClr>
+              <a:buFont typeface="Arial"/>
+              <a:buChar char="−"/>
+              <a:tabLst>
+                <a:tab pos="0" algn="l"/>
+              </a:tabLst>
+            </a:pPr>
             <a:r>
               <a:rPr lang="en-US" sz="1600" spc="-1" dirty="0">
                 <a:solidFill>
                   <a:srgbClr val="000000"/>
                 </a:solidFill>
               </a:rPr>
-              <a:t>Final assignment deadline: March 31, 2022 - feasible? </a:t>
-            </a:r>
+              <a:t>For emergency (e.g., Zoom interruption): I will contact you via E-mail as soon as possible in emergency cases. So please keep an eye on your mailbox.</a:t>
+            </a:r>
+          </a:p>
+          <a:p>
+            <a:pPr marL="324000" lvl="2" indent="-323280">
+              <a:lnSpc>
+                <a:spcPct val="110000"/>
+              </a:lnSpc>
+              <a:buClr>
+                <a:srgbClr val="009AD1"/>
+              </a:buClr>
+              <a:buFont typeface="Arial"/>
+              <a:buChar char="−"/>
+              <a:tabLst>
+                <a:tab pos="0" algn="l"/>
+              </a:tabLst>
+            </a:pPr>
+            <a:endParaRPr lang="en-US" sz="1600" spc="-1" dirty="0">
+              <a:solidFill>
+                <a:srgbClr val="000000"/>
+              </a:solidFill>
+            </a:endParaRPr>
+          </a:p>
+          <a:p>
+            <a:pPr marL="324000" lvl="2" indent="-323280">
+              <a:lnSpc>
+                <a:spcPct val="110000"/>
+              </a:lnSpc>
+              <a:buClr>
+                <a:srgbClr val="009AD1"/>
+              </a:buClr>
+              <a:buFont typeface="Arial"/>
+              <a:buChar char="−"/>
+              <a:tabLst>
+                <a:tab pos="0" algn="l"/>
+              </a:tabLst>
+            </a:pPr>
+            <a:r>
+              <a:rPr lang="en-US" sz="1600" spc="-1" dirty="0">
+                <a:solidFill>
+                  <a:srgbClr val="000000"/>
+                </a:solidFill>
+              </a:rPr>
+              <a:t>Credits: </a:t>
+            </a:r>
+          </a:p>
+          <a:p>
+            <a:pPr marL="781200" lvl="3" indent="-323280">
+              <a:lnSpc>
+                <a:spcPct val="110000"/>
+              </a:lnSpc>
+              <a:buClr>
+                <a:srgbClr val="009AD1"/>
+              </a:buClr>
+              <a:buFont typeface="Arial"/>
+              <a:buChar char="−"/>
+              <a:tabLst>
+                <a:tab pos="0" algn="l"/>
+              </a:tabLst>
+            </a:pPr>
+            <a:r>
+              <a:rPr lang="en-US" sz="1600" spc="-1" dirty="0">
+                <a:solidFill>
+                  <a:srgbClr val="000000"/>
+                </a:solidFill>
+              </a:rPr>
+              <a:t>Participants who take the course for credits should complete a final assignment </a:t>
+            </a:r>
+          </a:p>
+          <a:p>
+            <a:pPr marL="457920" lvl="3">
+              <a:lnSpc>
+                <a:spcPct val="110000"/>
+              </a:lnSpc>
+              <a:buClr>
+                <a:srgbClr val="009AD1"/>
+              </a:buClr>
+              <a:tabLst>
+                <a:tab pos="0" algn="l"/>
+              </a:tabLst>
+            </a:pPr>
+            <a:r>
+              <a:rPr lang="en-US" sz="1600" spc="-1" dirty="0">
+                <a:solidFill>
+                  <a:srgbClr val="000000"/>
+                </a:solidFill>
+              </a:rPr>
+              <a:t>	(more information at the end of the seminar)</a:t>
+            </a:r>
+          </a:p>
+          <a:p>
+            <a:pPr marL="781200" lvl="3" indent="-323280">
+              <a:lnSpc>
+                <a:spcPct val="110000"/>
+              </a:lnSpc>
+              <a:buClr>
+                <a:srgbClr val="009AD1"/>
+              </a:buClr>
+              <a:buFont typeface="Arial"/>
+              <a:buChar char="−"/>
+              <a:tabLst>
+                <a:tab pos="0" algn="l"/>
+              </a:tabLst>
+            </a:pPr>
+            <a:r>
+              <a:rPr lang="en-US" sz="1600" spc="-1" dirty="0">
+                <a:solidFill>
+                  <a:srgbClr val="000000"/>
+                </a:solidFill>
+              </a:rPr>
+              <a:t>Deadline on March 31, 2022 </a:t>
+            </a:r>
+            <a:r>
+              <a:rPr lang="en-US" sz="1600" spc="-1" dirty="0">
+                <a:solidFill>
+                  <a:srgbClr val="000000"/>
+                </a:solidFill>
+                <a:sym typeface="Wingdings" pitchFamily="2" charset="2"/>
+              </a:rPr>
+              <a:t> Is the date</a:t>
+            </a:r>
+            <a:r>
+              <a:rPr lang="en-US" sz="1600" spc="-1" dirty="0">
+                <a:solidFill>
+                  <a:srgbClr val="000000"/>
+                </a:solidFill>
+              </a:rPr>
+              <a:t> feasible? </a:t>
+            </a:r>
+          </a:p>
+          <a:p>
+            <a:pPr marL="324000" lvl="2" indent="-323280">
+              <a:lnSpc>
+                <a:spcPct val="110000"/>
+              </a:lnSpc>
+              <a:buClr>
+                <a:srgbClr val="009AD1"/>
+              </a:buClr>
+              <a:buFont typeface="Arial"/>
+              <a:buChar char="−"/>
+              <a:tabLst>
+                <a:tab pos="0" algn="l"/>
+              </a:tabLst>
+            </a:pPr>
+            <a:endParaRPr lang="en-US" sz="1600" spc="-1" dirty="0">
+              <a:solidFill>
+                <a:srgbClr val="000000"/>
+              </a:solidFill>
+            </a:endParaRPr>
+          </a:p>
+          <a:p>
+            <a:pPr marL="324000" lvl="2" indent="-323280">
+              <a:lnSpc>
+                <a:spcPct val="110000"/>
+              </a:lnSpc>
+              <a:buClr>
+                <a:srgbClr val="009AD1"/>
+              </a:buClr>
+              <a:buFont typeface="Arial"/>
+              <a:buChar char="−"/>
+              <a:tabLst>
+                <a:tab pos="0" algn="l"/>
+              </a:tabLst>
+            </a:pPr>
+            <a:endParaRPr lang="en-US" sz="1600" spc="-1" dirty="0">
+              <a:solidFill>
+                <a:srgbClr val="000000"/>
+              </a:solidFill>
+            </a:endParaRPr>
           </a:p>
           <a:p>
             <a:pPr>
@@ -6768,14 +7662,11 @@
                 <a:tab pos="0" algn="l"/>
               </a:tabLst>
             </a:pPr>
-            <a:r>
-              <a:rPr lang="en-US" sz="1600" spc="-1" dirty="0">
-                <a:solidFill>
-                  <a:srgbClr val="000000"/>
-                </a:solidFill>
-              </a:rPr>
-              <a:t>Portability: Python runs on almost every major operating system</a:t>
-            </a:r>
+            <a:endParaRPr lang="en-US" sz="1600" spc="-1" dirty="0">
+              <a:solidFill>
+                <a:srgbClr val="000000"/>
+              </a:solidFill>
+            </a:endParaRPr>
           </a:p>
           <a:p>
             <a:pPr marL="324000" lvl="2" indent="-323280">
@@ -6797,8 +7688,71 @@
                   <a:srgbClr val="000000"/>
                 </a:solidFill>
               </a:rPr>
+              <a:t>Portability: Python runs on almost every major operating system</a:t>
+            </a:r>
+          </a:p>
+          <a:p>
+            <a:pPr marL="324000" lvl="2" indent="-323280">
+              <a:lnSpc>
+                <a:spcPct val="110000"/>
+              </a:lnSpc>
+              <a:buClr>
+                <a:srgbClr val="009AD1"/>
+              </a:buClr>
+              <a:buFont typeface="Arial"/>
+              <a:buChar char="−"/>
+              <a:tabLst>
+                <a:tab pos="0" algn="l"/>
+              </a:tabLst>
+            </a:pPr>
+            <a:endParaRPr lang="en-US" sz="1600" spc="-1" dirty="0">
+              <a:solidFill>
+                <a:srgbClr val="000000"/>
+              </a:solidFill>
+            </a:endParaRPr>
+          </a:p>
+          <a:p>
+            <a:pPr marL="324000" lvl="2" indent="-323280">
+              <a:lnSpc>
+                <a:spcPct val="110000"/>
+              </a:lnSpc>
+              <a:buClr>
+                <a:srgbClr val="009AD1"/>
+              </a:buClr>
+              <a:buFont typeface="Arial"/>
+              <a:buChar char="−"/>
+              <a:tabLst>
+                <a:tab pos="0" algn="l"/>
+              </a:tabLst>
+            </a:pPr>
+            <a:r>
+              <a:rPr lang="en-US" sz="1600" spc="-1" dirty="0">
+                <a:solidFill>
+                  <a:srgbClr val="000000"/>
+                </a:solidFill>
+              </a:rPr>
               <a:t>Readability; Relatively easy to learn</a:t>
             </a:r>
+          </a:p>
+          <a:p>
+            <a:pPr marL="324000" lvl="2" indent="-323280">
+              <a:lnSpc>
+                <a:spcPct val="110000"/>
+              </a:lnSpc>
+              <a:buClr>
+                <a:srgbClr val="009AD1"/>
+              </a:buClr>
+              <a:buFont typeface="Arial"/>
+              <a:buChar char="−"/>
+              <a:tabLst>
+                <a:tab pos="0" algn="l"/>
+              </a:tabLst>
+            </a:pPr>
+            <a:endParaRPr lang="en-US" sz="1600" spc="-1" dirty="0">
+              <a:solidFill>
+                <a:srgbClr val="000000"/>
+              </a:solidFill>
+            </a:endParaRPr>
           </a:p>
           <a:p>
             <a:pPr marL="324000" lvl="2" indent="-323280">
@@ -7134,7 +8088,7 @@
               </a:lnSpc>
             </a:pPr>
             <a:r>
-              <a:rPr lang="de-DE" sz="2000" b="1" u="sng" spc="-1" dirty="0">
+              <a:rPr lang="de-DE" sz="2000" b="1" u="sng" spc="-1" dirty="0" err="1">
                 <a:solidFill>
                   <a:srgbClr val="000000"/>
                 </a:solidFill>
@@ -7145,7 +8099,77 @@
                 </a:uFill>
                 <a:latin typeface="Arial"/>
               </a:rPr>
-              <a:t>Interaction </a:t>
+              <a:t>Let‘s</a:t>
+            </a:r>
+            <a:r>
+              <a:rPr lang="de-DE" sz="2000" b="1" u="sng" spc="-1" dirty="0">
+                <a:solidFill>
+                  <a:srgbClr val="000000"/>
+                </a:solidFill>
+                <a:uFill>
+                  <a:solidFill>
+                    <a:srgbClr val="009AD1"/>
+                  </a:solidFill>
+                </a:uFill>
+                <a:latin typeface="Arial"/>
+              </a:rPr>
+              <a:t> Start: </a:t>
+            </a:r>
+            <a:r>
+              <a:rPr lang="de-DE" sz="2000" b="1" u="sng" spc="-1" dirty="0" err="1">
+                <a:solidFill>
+                  <a:srgbClr val="000000"/>
+                </a:solidFill>
+                <a:uFill>
+                  <a:solidFill>
+                    <a:srgbClr val="009AD1"/>
+                  </a:solidFill>
+                </a:uFill>
+                <a:latin typeface="Arial"/>
+              </a:rPr>
+              <a:t>Ways</a:t>
+            </a:r>
+            <a:r>
+              <a:rPr lang="de-DE" sz="2000" b="1" u="sng" spc="-1" dirty="0">
+                <a:solidFill>
+                  <a:srgbClr val="000000"/>
+                </a:solidFill>
+                <a:uFill>
+                  <a:solidFill>
+                    <a:srgbClr val="009AD1"/>
+                  </a:solidFill>
+                </a:uFill>
+                <a:latin typeface="Arial"/>
+              </a:rPr>
+              <a:t> </a:t>
+            </a:r>
+            <a:r>
+              <a:rPr lang="de-DE" sz="2000" b="1" u="sng" spc="-1" dirty="0" err="1">
+                <a:solidFill>
+                  <a:srgbClr val="000000"/>
+                </a:solidFill>
+                <a:uFill>
+                  <a:solidFill>
+                    <a:srgbClr val="009AD1"/>
+                  </a:solidFill>
+                </a:uFill>
+                <a:latin typeface="Arial"/>
+              </a:rPr>
+              <a:t>to</a:t>
+            </a:r>
+            <a:r>
+              <a:rPr lang="de-DE" sz="2000" b="1" u="sng" spc="-1" dirty="0">
+                <a:solidFill>
+                  <a:srgbClr val="000000"/>
+                </a:solidFill>
+                <a:uFill>
+                  <a:solidFill>
+                    <a:srgbClr val="009AD1"/>
+                  </a:solidFill>
+                </a:uFill>
+                <a:latin typeface="Arial"/>
+              </a:rPr>
+              <a:t> Interaction </a:t>
             </a:r>
             <a:r>
               <a:rPr lang="de-DE" sz="2000" b="1" u="sng" spc="-1" dirty="0" err="1">
@@ -7237,50 +8261,11 @@
                   <a:srgbClr val="000000"/>
                 </a:solidFill>
               </a:rPr>
-              <a:t>Command line </a:t>
-            </a:r>
-          </a:p>
-          <a:p>
-            <a:pPr marL="720" lvl="2">
-              <a:lnSpc>
-                <a:spcPct val="110000"/>
-              </a:lnSpc>
-              <a:buClr>
-                <a:srgbClr val="009AD1"/>
-              </a:buClr>
-              <a:tabLst>
-                <a:tab pos="0" algn="l"/>
-              </a:tabLst>
-            </a:pPr>
-            <a:r>
-              <a:rPr lang="en-US" sz="1600" b="1" spc="-1" dirty="0">
-                <a:solidFill>
-                  <a:schemeClr val="accent1"/>
-                </a:solidFill>
-              </a:rPr>
-              <a:t>(DEMO)</a:t>
-            </a:r>
-          </a:p>
-          <a:p>
-            <a:pPr marL="720" lvl="2">
-              <a:lnSpc>
-                <a:spcPct val="110000"/>
-              </a:lnSpc>
-              <a:buClr>
-                <a:srgbClr val="009AD1"/>
-              </a:buClr>
-              <a:tabLst>
-                <a:tab pos="0" algn="l"/>
-              </a:tabLst>
-            </a:pPr>
-            <a:endParaRPr lang="en-US" sz="1600" spc="-1" dirty="0">
-              <a:solidFill>
-                <a:srgbClr val="000000"/>
-              </a:solidFill>
-            </a:endParaRPr>
-          </a:p>
-          <a:p>
-            <a:pPr marL="324000" lvl="2" indent="-323280">
+              <a:t>Using command line</a:t>
+            </a:r>
+          </a:p>
+          <a:p>
+            <a:pPr marL="781200" lvl="3" indent="-323280">
               <a:lnSpc>
                 <a:spcPct val="110000"/>
               </a:lnSpc>
@@ -7299,58 +8284,41 @@
                   <a:srgbClr val="000000"/>
                 </a:solidFill>
               </a:rPr>
-              <a:t>IDE</a:t>
-            </a:r>
-            <a:r>
-              <a:rPr lang="en-US" sz="1600" b="1" spc="-1" dirty="0">
-                <a:solidFill>
-                  <a:srgbClr val="000000"/>
-                </a:solidFill>
-              </a:rPr>
-              <a:t> </a:t>
-            </a:r>
-          </a:p>
-          <a:p>
-            <a:pPr marL="720" lvl="2">
-              <a:lnSpc>
-                <a:spcPct val="110000"/>
-              </a:lnSpc>
-              <a:buClr>
-                <a:srgbClr val="009AD1"/>
-              </a:buClr>
-              <a:tabLst>
-                <a:tab pos="0" algn="l"/>
-              </a:tabLst>
-            </a:pPr>
-            <a:r>
-              <a:rPr lang="en-US" sz="1600" b="1" spc="-1" dirty="0">
-                <a:solidFill>
-                  <a:schemeClr val="accent1"/>
-                </a:solidFill>
-              </a:rPr>
-              <a:t>(DEMO)</a:t>
-            </a:r>
-          </a:p>
-          <a:p>
-            <a:pPr marL="720" lvl="2">
-              <a:lnSpc>
-                <a:spcPct val="110000"/>
-              </a:lnSpc>
-              <a:buClr>
-                <a:srgbClr val="009AD1"/>
-              </a:buClr>
-              <a:tabLst>
-                <a:tab pos="0" algn="l"/>
-              </a:tabLst>
-            </a:pPr>
-            <a:endParaRPr lang="en-US" sz="1600" b="1" spc="-1" dirty="0">
+              <a:t>Open </a:t>
+            </a:r>
+            <a:r>
+              <a:rPr lang="en-US" sz="1600" i="1" spc="-1" dirty="0">
+                <a:solidFill>
+                  <a:srgbClr val="000000"/>
+                </a:solidFill>
+              </a:rPr>
+              <a:t>Command Prompt</a:t>
+            </a:r>
+            <a:r>
+              <a:rPr lang="en-US" sz="1600" spc="-1" dirty="0">
+                <a:solidFill>
+                  <a:srgbClr val="000000"/>
+                </a:solidFill>
+              </a:rPr>
+              <a:t> in Windows: </a:t>
+            </a:r>
+            <a:r>
+              <a:rPr lang="en-US" sz="1600" spc="-1" dirty="0">
+                <a:solidFill>
+                  <a:srgbClr val="000000"/>
+                </a:solidFill>
+                <a:hlinkClick r:id="rId3"/>
+              </a:rPr>
+              <a:t>https://www.howtogeek.com/235101/10-ways-to-open-the-command-prompt-in-windows-10/</a:t>
+            </a:r>
+            <a:endParaRPr lang="en-US" sz="1600" spc="-1" dirty="0">
               <a:solidFill>
                 <a:srgbClr val="000000"/>
               </a:solidFill>
             </a:endParaRPr>
           </a:p>
           <a:p>
-            <a:pPr marL="324000" lvl="2" indent="-323280">
+            <a:pPr marL="781200" lvl="3" indent="-323280">
               <a:lnSpc>
                 <a:spcPct val="110000"/>
               </a:lnSpc>
@@ -7364,28 +8332,20 @@
               </a:tabLst>
             </a:pPr>
             <a:r>
-              <a:rPr lang="en-US" sz="1600" spc="-1" dirty="0" err="1">
-                <a:solidFill>
-                  <a:srgbClr val="000000"/>
-                </a:solidFill>
-              </a:rPr>
-              <a:t>Jupyter</a:t>
-            </a:r>
-            <a:r>
               <a:rPr lang="en-US" sz="1600" spc="-1" dirty="0">
                 <a:solidFill>
                   <a:srgbClr val="000000"/>
                 </a:solidFill>
               </a:rPr>
-              <a:t> (</a:t>
-            </a:r>
-            <a:r>
-              <a:rPr lang="en-US" sz="1600" spc="-1" dirty="0" err="1">
-                <a:solidFill>
-                  <a:srgbClr val="000000"/>
-                </a:solidFill>
-              </a:rPr>
-              <a:t>Jupyter</a:t>
+              <a:t>Open </a:t>
+            </a:r>
+            <a:r>
+              <a:rPr lang="en-US" sz="1600" i="1" spc="-1" dirty="0">
+                <a:solidFill>
+                  <a:srgbClr val="000000"/>
+                </a:solidFill>
+              </a:rPr>
+              <a:t>Terminal</a:t>
             </a:r>
             <a:r>
               <a:rPr lang="en-US" sz="1600" spc="-1" dirty="0">
@@ -7393,54 +8353,17 @@
                   <a:srgbClr val="000000"/>
                 </a:solidFill>
               </a:rPr>
-              <a:t> Lab, </a:t>
-            </a:r>
-            <a:r>
-              <a:rPr lang="en-US" sz="1600" spc="-1" dirty="0" err="1">
-                <a:solidFill>
-                  <a:srgbClr val="000000"/>
-                </a:solidFill>
-              </a:rPr>
-              <a:t>Jupyter</a:t>
+              <a:t> in Mac OS: </a:t>
             </a:r>
             <a:r>
               <a:rPr lang="en-US" sz="1600" spc="-1" dirty="0">
                 <a:solidFill>
                   <a:srgbClr val="000000"/>
                 </a:solidFill>
-              </a:rPr>
-              <a:t> Notebook, </a:t>
-            </a:r>
-            <a:r>
-              <a:rPr lang="en-US" sz="1600" spc="-1" dirty="0" err="1">
-                <a:solidFill>
-                  <a:srgbClr val="000000"/>
-                </a:solidFill>
-              </a:rPr>
-              <a:t>Jupyter</a:t>
-            </a:r>
-            <a:r>
-              <a:rPr lang="en-US" sz="1600" spc="-1" dirty="0">
-                <a:solidFill>
-                  <a:srgbClr val="000000"/>
-                </a:solidFill>
-              </a:rPr>
-              <a:t> Hub)</a:t>
-            </a:r>
-            <a:endParaRPr lang="en-US" sz="1600" spc="-1" dirty="0"/>
-          </a:p>
-          <a:p>
-            <a:pPr marL="720" lvl="2">
-              <a:lnSpc>
-                <a:spcPct val="110000"/>
-              </a:lnSpc>
-              <a:buClr>
-                <a:srgbClr val="009AD1"/>
-              </a:buClr>
-              <a:tabLst>
-                <a:tab pos="0" algn="l"/>
-              </a:tabLst>
-            </a:pPr>
+                <a:hlinkClick r:id="rId4"/>
+              </a:rPr>
+              <a:t>https://www.idownloadblog.com/2019/04/19/ways-open-terminal-mac/</a:t>
+            </a:r>
             <a:endParaRPr lang="en-US" sz="1600" spc="-1" dirty="0">
               <a:solidFill>
                 <a:srgbClr val="000000"/>
@@ -7448,52 +8371,329 @@
             </a:endParaRPr>
           </a:p>
           <a:p>
-            <a:pPr>
-              <a:lnSpc>
-                <a:spcPct val="110000"/>
-              </a:lnSpc>
-              <a:tabLst>
-                <a:tab pos="0" algn="l"/>
-              </a:tabLst>
-            </a:pPr>
-            <a:r>
-              <a:rPr lang="en-US" sz="1600" spc="-1" dirty="0">
-                <a:solidFill>
-                  <a:srgbClr val="000000"/>
-                </a:solidFill>
-              </a:rPr>
-              <a:t>		</a:t>
-            </a:r>
-            <a:r>
-              <a:rPr lang="en-US" sz="1600" spc="-1" dirty="0">
-                <a:solidFill>
-                  <a:srgbClr val="000000"/>
-                </a:solidFill>
-                <a:sym typeface="Wingdings" pitchFamily="2" charset="2"/>
-              </a:rPr>
-              <a:t> We will use </a:t>
-            </a:r>
-            <a:r>
-              <a:rPr lang="en-US" sz="1600" b="1" spc="-1" dirty="0" err="1">
-                <a:solidFill>
-                  <a:srgbClr val="000000"/>
-                </a:solidFill>
-                <a:sym typeface="Wingdings" pitchFamily="2" charset="2"/>
-              </a:rPr>
-              <a:t>Jupyter</a:t>
-            </a:r>
-            <a:r>
-              <a:rPr lang="en-US" sz="1600" spc="-1" dirty="0">
-                <a:solidFill>
-                  <a:srgbClr val="000000"/>
-                </a:solidFill>
-                <a:sym typeface="Wingdings" pitchFamily="2" charset="2"/>
-              </a:rPr>
-              <a:t> for this course.</a:t>
-            </a:r>
+            <a:pPr marL="720" lvl="2">
+              <a:lnSpc>
+                <a:spcPct val="110000"/>
+              </a:lnSpc>
+              <a:buClr>
+                <a:srgbClr val="009AD1"/>
+              </a:buClr>
+              <a:tabLst>
+                <a:tab pos="0" algn="l"/>
+              </a:tabLst>
+            </a:pPr>
+            <a:r>
+              <a:rPr lang="en-US" sz="1600" b="1" spc="-1" dirty="0">
+                <a:solidFill>
+                  <a:schemeClr val="accent1"/>
+                </a:solidFill>
+              </a:rPr>
+              <a:t>(DEMO)</a:t>
+            </a:r>
+          </a:p>
+          <a:p>
+            <a:pPr marL="720" lvl="2">
+              <a:lnSpc>
+                <a:spcPct val="110000"/>
+              </a:lnSpc>
+              <a:buClr>
+                <a:srgbClr val="009AD1"/>
+              </a:buClr>
+              <a:tabLst>
+                <a:tab pos="0" algn="l"/>
+              </a:tabLst>
+            </a:pPr>
             <a:endParaRPr lang="en-US" sz="1600" spc="-1" dirty="0">
               <a:solidFill>
                 <a:srgbClr val="000000"/>
+              </a:solidFill>
+            </a:endParaRPr>
+          </a:p>
+          <a:p>
+            <a:pPr marL="324000" lvl="2" indent="-323280">
+              <a:lnSpc>
+                <a:spcPct val="110000"/>
+              </a:lnSpc>
+              <a:buClr>
+                <a:srgbClr val="009AD1"/>
+              </a:buClr>
+              <a:buFont typeface="Arial"/>
+              <a:buChar char="−"/>
+              <a:tabLst>
+                <a:tab pos="0" algn="l"/>
+              </a:tabLst>
+            </a:pPr>
+            <a:r>
+              <a:rPr lang="en-US" sz="1600" spc="-1" dirty="0">
+                <a:solidFill>
+                  <a:srgbClr val="000000"/>
+                </a:solidFill>
+              </a:rPr>
+              <a:t>Using IDE</a:t>
+            </a:r>
+            <a:r>
+              <a:rPr lang="en-US" sz="1600" b="1" spc="-1" dirty="0">
+                <a:solidFill>
+                  <a:srgbClr val="000000"/>
+                </a:solidFill>
+              </a:rPr>
+              <a:t> </a:t>
+            </a:r>
+            <a:r>
+              <a:rPr lang="de-DE" sz="1600" dirty="0"/>
+              <a:t>(</a:t>
+            </a:r>
+            <a:r>
+              <a:rPr lang="de-DE" sz="1600" i="1" u="sng" dirty="0"/>
+              <a:t>I</a:t>
+            </a:r>
+            <a:r>
+              <a:rPr lang="de-DE" sz="1600" i="1" dirty="0"/>
+              <a:t>ntegrated </a:t>
+            </a:r>
+            <a:r>
+              <a:rPr lang="de-DE" sz="1600" i="1" u="sng" dirty="0" err="1"/>
+              <a:t>d</a:t>
+            </a:r>
+            <a:r>
+              <a:rPr lang="de-DE" sz="1600" i="1" dirty="0" err="1"/>
+              <a:t>evelopment</a:t>
+            </a:r>
+            <a:r>
+              <a:rPr lang="de-DE" sz="1600" i="1" dirty="0"/>
+              <a:t> </a:t>
+            </a:r>
+            <a:r>
+              <a:rPr lang="de-DE" sz="1600" i="1" u="sng" dirty="0" err="1"/>
+              <a:t>e</a:t>
+            </a:r>
+            <a:r>
+              <a:rPr lang="de-DE" sz="1600" i="1" dirty="0" err="1"/>
+              <a:t>nvironment</a:t>
+            </a:r>
+            <a:r>
+              <a:rPr lang="de-DE" sz="1600" dirty="0"/>
+              <a:t>), e.g., </a:t>
+            </a:r>
+            <a:r>
+              <a:rPr lang="de-DE" sz="1600" dirty="0" err="1"/>
+              <a:t>PyCharm</a:t>
+            </a:r>
+            <a:endParaRPr lang="de-DE" sz="1600" dirty="0"/>
+          </a:p>
+          <a:p>
+            <a:pPr marL="324000" lvl="2" indent="-323280">
+              <a:lnSpc>
+                <a:spcPct val="110000"/>
+              </a:lnSpc>
+              <a:buClr>
+                <a:srgbClr val="009AD1"/>
+              </a:buClr>
+              <a:buFont typeface="Arial"/>
+              <a:buChar char="−"/>
+              <a:tabLst>
+                <a:tab pos="0" algn="l"/>
+              </a:tabLst>
+            </a:pPr>
+            <a:endParaRPr lang="en-US" sz="1600" b="1" spc="-1" dirty="0">
+              <a:solidFill>
+                <a:srgbClr val="000000"/>
+              </a:solidFill>
+            </a:endParaRPr>
+          </a:p>
+          <a:p>
+            <a:pPr marL="720" lvl="2">
+              <a:lnSpc>
+                <a:spcPct val="110000"/>
+              </a:lnSpc>
+              <a:buClr>
+                <a:srgbClr val="009AD1"/>
+              </a:buClr>
+              <a:tabLst>
+                <a:tab pos="0" algn="l"/>
+              </a:tabLst>
+            </a:pPr>
+            <a:r>
+              <a:rPr lang="en-US" sz="1600" b="1" spc="-1" dirty="0">
+                <a:solidFill>
+                  <a:schemeClr val="accent1"/>
+                </a:solidFill>
+              </a:rPr>
+              <a:t>(DEMO)</a:t>
+            </a:r>
+          </a:p>
+          <a:p>
+            <a:pPr marL="720" lvl="2">
+              <a:lnSpc>
+                <a:spcPct val="110000"/>
+              </a:lnSpc>
+              <a:buClr>
+                <a:srgbClr val="009AD1"/>
+              </a:buClr>
+              <a:tabLst>
+                <a:tab pos="0" algn="l"/>
+              </a:tabLst>
+            </a:pPr>
+            <a:endParaRPr lang="en-US" sz="1600" b="1" spc="-1" dirty="0">
+              <a:solidFill>
+                <a:srgbClr val="000000"/>
+              </a:solidFill>
+            </a:endParaRPr>
+          </a:p>
+          <a:p>
+            <a:pPr marL="324000" lvl="2" indent="-323280">
+              <a:lnSpc>
+                <a:spcPct val="110000"/>
+              </a:lnSpc>
+              <a:buClr>
+                <a:srgbClr val="009AD1"/>
+              </a:buClr>
+              <a:buFont typeface="Arial"/>
+              <a:buChar char="−"/>
+              <a:tabLst>
+                <a:tab pos="0" algn="l"/>
+              </a:tabLst>
+            </a:pPr>
+            <a:r>
+              <a:rPr lang="en-US" sz="1600" spc="-1" dirty="0" err="1">
+                <a:solidFill>
+                  <a:srgbClr val="000000"/>
+                </a:solidFill>
+              </a:rPr>
+              <a:t>Jupyter</a:t>
+            </a:r>
+            <a:r>
+              <a:rPr lang="en-US" sz="1600" spc="-1" dirty="0">
+                <a:solidFill>
+                  <a:srgbClr val="000000"/>
+                </a:solidFill>
+              </a:rPr>
+              <a:t> (</a:t>
+            </a:r>
+            <a:r>
+              <a:rPr lang="en-US" sz="1600" spc="-1" dirty="0" err="1">
+                <a:solidFill>
+                  <a:srgbClr val="000000"/>
+                </a:solidFill>
+              </a:rPr>
+              <a:t>Jupyter</a:t>
+            </a:r>
+            <a:r>
+              <a:rPr lang="en-US" sz="1600" spc="-1" dirty="0">
+                <a:solidFill>
+                  <a:srgbClr val="000000"/>
+                </a:solidFill>
+              </a:rPr>
+              <a:t> Lab, </a:t>
+            </a:r>
+            <a:r>
+              <a:rPr lang="en-US" sz="1600" spc="-1" dirty="0" err="1">
+                <a:solidFill>
+                  <a:srgbClr val="000000"/>
+                </a:solidFill>
+              </a:rPr>
+              <a:t>Jupyter</a:t>
+            </a:r>
+            <a:r>
+              <a:rPr lang="en-US" sz="1600" spc="-1" dirty="0">
+                <a:solidFill>
+                  <a:srgbClr val="000000"/>
+                </a:solidFill>
+              </a:rPr>
+              <a:t> Notebook, </a:t>
+            </a:r>
+            <a:r>
+              <a:rPr lang="en-US" sz="1600" spc="-1" dirty="0" err="1">
+                <a:solidFill>
+                  <a:srgbClr val="000000"/>
+                </a:solidFill>
+              </a:rPr>
+              <a:t>Jupyter</a:t>
+            </a:r>
+            <a:r>
+              <a:rPr lang="en-US" sz="1600" spc="-1" dirty="0">
+                <a:solidFill>
+                  <a:srgbClr val="000000"/>
+                </a:solidFill>
+              </a:rPr>
+              <a:t> Hub)</a:t>
+            </a:r>
+            <a:endParaRPr lang="en-US" sz="1600" spc="-1" dirty="0"/>
+          </a:p>
+          <a:p>
+            <a:pPr marL="720" lvl="2">
+              <a:lnSpc>
+                <a:spcPct val="110000"/>
+              </a:lnSpc>
+              <a:buClr>
+                <a:srgbClr val="009AD1"/>
+              </a:buClr>
+              <a:tabLst>
+                <a:tab pos="0" algn="l"/>
+              </a:tabLst>
+            </a:pPr>
+            <a:endParaRPr lang="en-US" sz="1600" spc="-1" dirty="0">
+              <a:solidFill>
+                <a:srgbClr val="000000"/>
+              </a:solidFill>
+            </a:endParaRPr>
+          </a:p>
+          <a:p>
+            <a:pPr>
+              <a:lnSpc>
+                <a:spcPct val="110000"/>
+              </a:lnSpc>
+              <a:tabLst>
+                <a:tab pos="0" algn="l"/>
+              </a:tabLst>
+            </a:pPr>
+            <a:r>
+              <a:rPr lang="en-US" sz="1600" spc="-1" dirty="0">
+                <a:solidFill>
+                  <a:srgbClr val="000000"/>
+                </a:solidFill>
+              </a:rPr>
+              <a:t>		</a:t>
+            </a:r>
+            <a:r>
+              <a:rPr lang="en-US" sz="1600" spc="-1" dirty="0">
+                <a:solidFill>
+                  <a:srgbClr val="000000"/>
+                </a:solidFill>
+                <a:sym typeface="Wingdings" pitchFamily="2" charset="2"/>
+              </a:rPr>
+              <a:t> </a:t>
+            </a:r>
+            <a:r>
+              <a:rPr lang="en-US" sz="1600" b="1" spc="-1" dirty="0">
+                <a:solidFill>
+                  <a:srgbClr val="C00000"/>
+                </a:solidFill>
+                <a:sym typeface="Wingdings" pitchFamily="2" charset="2"/>
+              </a:rPr>
+              <a:t>We will use </a:t>
+            </a:r>
+            <a:r>
+              <a:rPr lang="en-US" sz="1600" b="1" spc="-1" dirty="0" err="1">
+                <a:solidFill>
+                  <a:srgbClr val="C00000"/>
+                </a:solidFill>
+                <a:sym typeface="Wingdings" pitchFamily="2" charset="2"/>
+              </a:rPr>
+              <a:t>JupyterLab</a:t>
+            </a:r>
+            <a:r>
+              <a:rPr lang="en-US" sz="1600" b="1" spc="-1" dirty="0">
+                <a:solidFill>
+                  <a:srgbClr val="C00000"/>
+                </a:solidFill>
+                <a:sym typeface="Wingdings" pitchFamily="2" charset="2"/>
+              </a:rPr>
+              <a:t> for this course.</a:t>
+            </a:r>
+            <a:endParaRPr lang="en-US" sz="1600" b="1" spc="-1" dirty="0">
+              <a:solidFill>
+                <a:srgbClr val="C00000"/>
               </a:solidFill>
             </a:endParaRPr>
           </a:p>
@@ -8252,7 +9452,7 @@
             </a:r>
             <a:r>
               <a:rPr lang="en-US" sz="1600" spc="-1" dirty="0">
-                <a:hlinkClick r:id="rId2"/>
+                <a:hlinkClick r:id="rId3"/>
               </a:rPr>
               <a:t>https://jupyter.org/install</a:t>
             </a:r>
@@ -8346,7 +9546,70 @@
             </a:r>
           </a:p>
           <a:p>
-            <a:pPr marL="781200" lvl="3" indent="-323280">
+            <a:pPr marL="720" lvl="2">
+              <a:lnSpc>
+                <a:spcPct val="110000"/>
+              </a:lnSpc>
+              <a:buClr>
+                <a:srgbClr val="009AD1"/>
+              </a:buClr>
+              <a:tabLst>
+                <a:tab pos="0" algn="l"/>
+              </a:tabLst>
+            </a:pPr>
+            <a:r>
+              <a:rPr lang="en-US" sz="1600" b="1" spc="-1" dirty="0">
+                <a:solidFill>
+                  <a:schemeClr val="accent1"/>
+                </a:solidFill>
+              </a:rPr>
+              <a:t>(DEMO)</a:t>
+            </a:r>
+          </a:p>
+          <a:p>
+            <a:pPr>
+              <a:lnSpc>
+                <a:spcPct val="110000"/>
+              </a:lnSpc>
+              <a:tabLst>
+                <a:tab pos="0" algn="l"/>
+              </a:tabLst>
+            </a:pPr>
+            <a:endParaRPr lang="en-US" sz="1600" spc="-1" dirty="0">
+              <a:solidFill>
+                <a:srgbClr val="000000"/>
+              </a:solidFill>
+            </a:endParaRPr>
+          </a:p>
+          <a:p>
+            <a:pPr>
+              <a:lnSpc>
+                <a:spcPct val="110000"/>
+              </a:lnSpc>
+              <a:tabLst>
+                <a:tab pos="0" algn="l"/>
+              </a:tabLst>
+            </a:pPr>
+            <a:r>
+              <a:rPr lang="en-US" sz="1600" b="1" spc="-1" dirty="0"/>
+              <a:t>Shut down the </a:t>
+            </a:r>
+            <a:r>
+              <a:rPr lang="en-US" sz="1600" b="1" spc="-1" dirty="0" err="1"/>
+              <a:t>Jupyter</a:t>
+            </a:r>
+            <a:r>
+              <a:rPr lang="en-US" sz="1600" b="1" spc="-1" dirty="0"/>
+              <a:t> server: </a:t>
+            </a:r>
+            <a:endParaRPr lang="en-US" sz="1600" spc="-1" dirty="0">
+              <a:solidFill>
+                <a:srgbClr val="000000"/>
+              </a:solidFill>
+            </a:endParaRPr>
+          </a:p>
+          <a:p>
+            <a:pPr marL="324000" lvl="2" indent="-323280">
               <a:lnSpc>
                 <a:spcPct val="110000"/>
               </a:lnSpc>
@@ -8365,17 +9628,56 @@
                   <a:srgbClr val="000000"/>
                 </a:solidFill>
               </a:rPr>
-              <a:t>Windows: </a:t>
+              <a:t>Type </a:t>
+            </a:r>
+            <a:r>
+              <a:rPr lang="en-US" sz="1600" spc="-1" dirty="0" err="1">
+                <a:solidFill>
+                  <a:srgbClr val="000000"/>
+                </a:solidFill>
+                <a:latin typeface="Courier New" panose="02070309020205020404" pitchFamily="49" charset="0"/>
+                <a:cs typeface="Courier New" panose="02070309020205020404" pitchFamily="49" charset="0"/>
+              </a:rPr>
+              <a:t>ctrl+c</a:t>
             </a:r>
             <a:r>
               <a:rPr lang="en-US" sz="1600" spc="-1" dirty="0">
                 <a:solidFill>
                   <a:srgbClr val="000000"/>
                 </a:solidFill>
-                <a:hlinkClick r:id="rId3"/>
-              </a:rPr>
-              <a:t>https://www.howtogeek.com/235101/10-ways-to-open-the-command-prompt-in-windows-10/</a:t>
-            </a:r>
+              </a:rPr>
+              <a:t> in terminal/command prompt : </a:t>
+            </a:r>
+            <a:r>
+              <a:rPr lang="en-US" sz="1600" spc="-1" dirty="0" err="1">
+                <a:solidFill>
+                  <a:srgbClr val="000000"/>
+                </a:solidFill>
+                <a:latin typeface="Courier New" panose="02070309020205020404" pitchFamily="49" charset="0"/>
+                <a:cs typeface="Courier New" panose="02070309020205020404" pitchFamily="49" charset="0"/>
+              </a:rPr>
+              <a:t>jupyter</a:t>
+            </a:r>
+            <a:r>
+              <a:rPr lang="en-US" sz="1600" spc="-1" dirty="0">
+                <a:solidFill>
+                  <a:srgbClr val="000000"/>
+                </a:solidFill>
+                <a:latin typeface="Courier New" panose="02070309020205020404" pitchFamily="49" charset="0"/>
+                <a:cs typeface="Courier New" panose="02070309020205020404" pitchFamily="49" charset="0"/>
+              </a:rPr>
+              <a:t>-lab</a:t>
+            </a:r>
+          </a:p>
+          <a:p>
+            <a:pPr>
+              <a:lnSpc>
+                <a:spcPct val="110000"/>
+              </a:lnSpc>
+              <a:tabLst>
+                <a:tab pos="0" algn="l"/>
+              </a:tabLst>
+            </a:pPr>
             <a:endParaRPr lang="en-US" sz="1600" spc="-1" dirty="0">
               <a:solidFill>
                 <a:srgbClr val="000000"/>
@@ -8395,49 +9697,24 @@
               </a:tabLst>
             </a:pPr>
             <a:r>
-              <a:rPr lang="en-US" sz="1600" b="1" spc="-1" dirty="0">
-                <a:solidFill>
-                  <a:schemeClr val="accent1"/>
-                </a:solidFill>
-              </a:rPr>
-              <a:t>(DEMO)</a:t>
-            </a:r>
-          </a:p>
-          <a:p>
-            <a:pPr>
-              <a:lnSpc>
-                <a:spcPct val="110000"/>
-              </a:lnSpc>
-              <a:tabLst>
-                <a:tab pos="0" algn="l"/>
-              </a:tabLst>
-            </a:pPr>
-            <a:endParaRPr lang="en-US" sz="1600" spc="-1" dirty="0">
-              <a:solidFill>
-                <a:srgbClr val="000000"/>
-              </a:solidFill>
-            </a:endParaRPr>
-          </a:p>
-          <a:p>
-            <a:pPr>
-              <a:lnSpc>
-                <a:spcPct val="110000"/>
-              </a:lnSpc>
-              <a:tabLst>
-                <a:tab pos="0" algn="l"/>
-              </a:tabLst>
-            </a:pPr>
-            <a:r>
               <a:rPr lang="en-US" sz="1600" b="1" spc="-1" dirty="0"/>
-              <a:t>Shut down the </a:t>
+              <a:t>Use </a:t>
             </a:r>
             <a:r>
               <a:rPr lang="en-US" sz="1600" b="1" spc="-1" dirty="0" err="1"/>
-              <a:t>Jupyter</a:t>
+              <a:t>JupyterLab</a:t>
             </a:r>
             <a:r>
               <a:rPr lang="en-US" sz="1600" b="1" spc="-1" dirty="0"/>
-              <a:t> server: </a:t>
+              <a:t> to open an existing .</a:t>
+            </a:r>
+            <a:r>
+              <a:rPr lang="en-US" sz="1600" b="1" spc="-1" dirty="0" err="1"/>
+              <a:t>ipynb</a:t>
+            </a:r>
+            <a:r>
+              <a:rPr lang="en-US" sz="1600" b="1" spc="-1" dirty="0"/>
+              <a:t> file: </a:t>
             </a:r>
             <a:endParaRPr lang="en-US" sz="1600" spc="-1" dirty="0">
               <a:solidFill>
@@ -8465,25 +9742,17 @@
                   <a:srgbClr val="000000"/>
                 </a:solidFill>
               </a:rPr>
-              <a:t>Type </a:t>
-            </a:r>
-            <a:r>
-              <a:rPr lang="en-US" sz="1600" spc="-1" dirty="0" err="1">
+              <a:t>Type in terminal/command prompt: </a:t>
+            </a:r>
+            <a:r>
+              <a:rPr lang="en-US" sz="1600" spc="-1" dirty="0">
                 <a:solidFill>
                   <a:srgbClr val="000000"/>
                 </a:solidFill>
                 <a:latin typeface="Courier New" panose="02070309020205020404" pitchFamily="49" charset="0"/>
                 <a:cs typeface="Courier New" panose="02070309020205020404" pitchFamily="49" charset="0"/>
               </a:rPr>
-              <a:t>ctrl+c</a:t>
-            </a:r>
-            <a:r>
-              <a:rPr lang="en-US" sz="1600" spc="-1" dirty="0">
-                <a:solidFill>
-                  <a:srgbClr val="000000"/>
-                </a:solidFill>
-              </a:rPr>
-              <a:t> in terminal/command prompt : </a:t>
+              <a:t>cd </a:t>
             </a:r>
             <a:r>
               <a:rPr lang="en-US" sz="1600" spc="-1" dirty="0" err="1">
@@ -8493,70 +9762,14 @@
                 <a:latin typeface="Courier New" panose="02070309020205020404" pitchFamily="49" charset="0"/>
                 <a:cs typeface="Courier New" panose="02070309020205020404" pitchFamily="49" charset="0"/>
               </a:rPr>
-              <a:t>jupyter</a:t>
-            </a:r>
-            <a:r>
-              <a:rPr lang="en-US" sz="1600" spc="-1" dirty="0">
-                <a:solidFill>
-                  <a:srgbClr val="000000"/>
-                </a:solidFill>
-                <a:latin typeface="Courier New" panose="02070309020205020404" pitchFamily="49" charset="0"/>
-                <a:cs typeface="Courier New" panose="02070309020205020404" pitchFamily="49" charset="0"/>
-              </a:rPr>
-              <a:t>-lab</a:t>
-            </a:r>
-          </a:p>
-          <a:p>
-            <a:pPr>
-              <a:lnSpc>
-                <a:spcPct val="110000"/>
-              </a:lnSpc>
-              <a:tabLst>
-                <a:tab pos="0" algn="l"/>
-              </a:tabLst>
-            </a:pPr>
+              <a:t>directory_of_your_file</a:t>
+            </a:r>
             <a:endParaRPr lang="en-US" sz="1600" spc="-1" dirty="0">
               <a:solidFill>
                 <a:srgbClr val="000000"/>
               </a:solidFill>
-            </a:endParaRPr>
-          </a:p>
-          <a:p>
-            <a:pPr marL="720" lvl="2">
-              <a:lnSpc>
-                <a:spcPct val="110000"/>
-              </a:lnSpc>
-              <a:buClr>
-                <a:srgbClr val="009AD1"/>
-              </a:buClr>
-              <a:tabLst>
-                <a:tab pos="0" algn="l"/>
-              </a:tabLst>
-            </a:pPr>
-            <a:r>
-              <a:rPr lang="en-US" sz="1600" b="1" spc="-1" dirty="0"/>
-              <a:t>Use </a:t>
-            </a:r>
-            <a:r>
-              <a:rPr lang="en-US" sz="1600" b="1" spc="-1" dirty="0" err="1"/>
-              <a:t>JupyterLab</a:t>
-            </a:r>
-            <a:r>
-              <a:rPr lang="en-US" sz="1600" b="1" spc="-1" dirty="0"/>
-              <a:t> to open an existing .</a:t>
-            </a:r>
-            <a:r>
-              <a:rPr lang="en-US" sz="1600" b="1" spc="-1" dirty="0" err="1"/>
-              <a:t>ipynb</a:t>
-            </a:r>
-            <a:r>
-              <a:rPr lang="en-US" sz="1600" b="1" spc="-1" dirty="0"/>
-              <a:t> file: </a:t>
-            </a:r>
-            <a:endParaRPr lang="en-US" sz="1600" spc="-1" dirty="0">
-              <a:solidFill>
-                <a:srgbClr val="000000"/>
-              </a:solidFill>
+              <a:latin typeface="Courier New" panose="02070309020205020404" pitchFamily="49" charset="0"/>
+              <a:cs typeface="Courier New" panose="02070309020205020404" pitchFamily="49" charset="0"/>
             </a:endParaRPr>
           </a:p>
           <a:p>
@@ -8579,7 +9792,7 @@
                   <a:srgbClr val="000000"/>
                 </a:solidFill>
               </a:rPr>
-              <a:t>Type in terminal/command prompt : </a:t>
+              <a:t>Then type in terminal/command prompt : </a:t>
             </a:r>
             <a:r>
               <a:rPr lang="en-US" sz="1600" spc="-1" dirty="0" err="1">

</xml_diff>